<commit_message>
tweaked slides for M17
</commit_message>
<xml_diff>
--- a/Slides/Module 17 Using AI Agents.pptx
+++ b/Slides/Module 17 Using AI Agents.pptx
@@ -23,8 +23,8 @@
     <p:sldId id="721" r:id="rId14"/>
     <p:sldId id="722" r:id="rId15"/>
     <p:sldId id="723" r:id="rId16"/>
-    <p:sldId id="724" r:id="rId17"/>
-    <p:sldId id="725" r:id="rId18"/>
+    <p:sldId id="725" r:id="rId17"/>
+    <p:sldId id="724" r:id="rId18"/>
     <p:sldId id="726" r:id="rId19"/>
     <p:sldId id="727" r:id="rId20"/>
     <p:sldId id="728" r:id="rId21"/>
@@ -180,8 +180,8 @@
             <p14:sldId id="721"/>
             <p14:sldId id="722"/>
             <p14:sldId id="723"/>
+            <p14:sldId id="725"/>
             <p14:sldId id="724"/>
-            <p14:sldId id="725"/>
             <p14:sldId id="726"/>
             <p14:sldId id="727"/>
             <p14:sldId id="728"/>
@@ -315,7 +315,7 @@
           <a:p>
             <a:fld id="{7C7E5181-6CF5-45F7-A87A-E0E0B1FD7549}" type="datetimeFigureOut">
               <a:rPr lang="en-US" smtClean="0"/>
-              <a:t>11/18/2025</a:t>
+              <a:t>11/19/2025</a:t>
             </a:fld>
             <a:endParaRPr lang="en-US"/>
           </a:p>
@@ -1796,7 +1796,7 @@
           <a:p>
             <a:fld id="{07937F07-1250-4CCE-B198-1B2887014F41}" type="slidenum">
               <a:rPr lang="en-US" smtClean="0"/>
-              <a:t>16</a:t>
+              <a:t>17</a:t>
             </a:fld>
             <a:endParaRPr lang="en-US"/>
           </a:p>
@@ -2345,7 +2345,7 @@
           <a:p>
             <a:fld id="{5D2A64DE-480B-420F-9649-4F8E696E08E0}" type="datetime1">
               <a:rPr lang="en-US" smtClean="0"/>
-              <a:t>11/18/2025</a:t>
+              <a:t>11/19/2025</a:t>
             </a:fld>
             <a:endParaRPr lang="en-US"/>
           </a:p>
@@ -2669,7 +2669,7 @@
           <a:p>
             <a:fld id="{EA476A42-A091-4468-A075-64A31BE59948}" type="datetime1">
               <a:rPr lang="en-US" smtClean="0"/>
-              <a:t>11/18/2025</a:t>
+              <a:t>11/19/2025</a:t>
             </a:fld>
             <a:endParaRPr lang="en-US"/>
           </a:p>
@@ -2867,7 +2867,7 @@
           <a:p>
             <a:fld id="{0D3616D0-8311-4107-9726-6B805E7D05BA}" type="datetime1">
               <a:rPr lang="en-US" smtClean="0"/>
-              <a:t>11/18/2025</a:t>
+              <a:t>11/19/2025</a:t>
             </a:fld>
             <a:endParaRPr lang="en-US"/>
           </a:p>
@@ -3075,7 +3075,7 @@
           <a:p>
             <a:fld id="{3BC2557A-5C88-417A-A763-5AC779462A5F}" type="datetime1">
               <a:rPr lang="en-US" smtClean="0"/>
-              <a:t>11/18/2025</a:t>
+              <a:t>11/19/2025</a:t>
             </a:fld>
             <a:endParaRPr lang="en-US"/>
           </a:p>
@@ -3599,7 +3599,7 @@
           <a:p>
             <a:fld id="{07C7BFD4-467E-4EDE-93EA-052F5B39A4E5}" type="datetime1">
               <a:rPr lang="en-US" smtClean="0"/>
-              <a:t>11/18/2025</a:t>
+              <a:t>11/19/2025</a:t>
             </a:fld>
             <a:endParaRPr lang="en-US"/>
           </a:p>
@@ -3849,7 +3849,7 @@
           <a:p>
             <a:fld id="{07C7BFD4-467E-4EDE-93EA-052F5B39A4E5}" type="datetime1">
               <a:rPr lang="en-US" smtClean="0"/>
-              <a:t>11/18/2025</a:t>
+              <a:t>11/19/2025</a:t>
             </a:fld>
             <a:endParaRPr lang="en-US"/>
           </a:p>
@@ -4037,7 +4037,7 @@
           <a:p>
             <a:fld id="{109E55A0-C911-4F03-82FC-7E5926047D46}" type="datetime1">
               <a:rPr lang="en-US" smtClean="0"/>
-              <a:t>11/18/2025</a:t>
+              <a:t>11/19/2025</a:t>
             </a:fld>
             <a:endParaRPr lang="en-US"/>
           </a:p>
@@ -4350,7 +4350,7 @@
           <a:p>
             <a:fld id="{A533CBE2-D5BE-47AC-ADC2-9CDFC1D0CF90}" type="datetime1">
               <a:rPr lang="en-US" smtClean="0"/>
-              <a:t>11/18/2025</a:t>
+              <a:t>11/19/2025</a:t>
             </a:fld>
             <a:endParaRPr lang="en-US"/>
           </a:p>
@@ -4651,7 +4651,7 @@
           <a:p>
             <a:fld id="{39B7EDB1-CE74-4951-85A2-0B01C2128E28}" type="datetime1">
               <a:rPr lang="en-US" smtClean="0"/>
-              <a:t>11/18/2025</a:t>
+              <a:t>11/19/2025</a:t>
             </a:fld>
             <a:endParaRPr lang="en-US"/>
           </a:p>
@@ -5099,7 +5099,7 @@
           <a:p>
             <a:fld id="{2BC7EB92-A5C2-4807-A9DC-9EDE6CBFB241}" type="datetime1">
               <a:rPr lang="en-US" smtClean="0"/>
-              <a:t>11/18/2025</a:t>
+              <a:t>11/19/2025</a:t>
             </a:fld>
             <a:endParaRPr lang="en-US"/>
           </a:p>
@@ -5212,7 +5212,7 @@
           <a:p>
             <a:fld id="{2B7B7EE0-7771-4CD5-9B2B-3550753A54A1}" type="datetime1">
               <a:rPr lang="en-US" smtClean="0"/>
-              <a:t>11/18/2025</a:t>
+              <a:t>11/19/2025</a:t>
             </a:fld>
             <a:endParaRPr lang="en-US"/>
           </a:p>
@@ -5523,7 +5523,7 @@
           <a:p>
             <a:fld id="{F8B318B3-0E87-4416-A9B8-D891968C2727}" type="datetime1">
               <a:rPr lang="en-US" smtClean="0"/>
-              <a:t>11/18/2025</a:t>
+              <a:t>11/19/2025</a:t>
             </a:fld>
             <a:endParaRPr lang="en-US"/>
           </a:p>
@@ -5764,7 +5764,7 @@
           <a:p>
             <a:fld id="{54D997E8-DDEE-43F1-8D9B-F8A1E11DE488}" type="datetime1">
               <a:rPr lang="en-US" smtClean="0"/>
-              <a:t>11/18/2025</a:t>
+              <a:t>11/19/2025</a:t>
             </a:fld>
             <a:endParaRPr lang="en-US"/>
           </a:p>
@@ -6764,11 +6764,11 @@
           <a:p>
             <a:r>
               <a:rPr lang="en-US" b="1" dirty="0"/>
-              <a:t>Pattern Recognition</a:t>
-            </a:r>
-            <a:r>
-              <a:rPr lang="en-US" dirty="0"/>
-              <a:t>: Excel at recognizing and reproducing common coding patterns from their training data or applying patterns from one part of the codebase to another</a:t>
+              <a:t>Natural Language Understanding</a:t>
+            </a:r>
+            <a:r>
+              <a:rPr lang="en-US" dirty="0"/>
+              <a:t>: Can translate requirements and comments into working code</a:t>
             </a:r>
           </a:p>
           <a:p>
@@ -6784,26 +6784,6 @@
           <a:p>
             <a:r>
               <a:rPr lang="en-US" b="1" dirty="0"/>
-              <a:t>Cross-Domain Transfer</a:t>
-            </a:r>
-            <a:r>
-              <a:rPr lang="en-US" dirty="0"/>
-              <a:t>: Can apply patterns from one domain or language to another</a:t>
-            </a:r>
-          </a:p>
-          <a:p>
-            <a:r>
-              <a:rPr lang="en-US" b="1" dirty="0"/>
-              <a:t>Natural Language Understanding</a:t>
-            </a:r>
-            <a:r>
-              <a:rPr lang="en-US" dirty="0"/>
-              <a:t>: Can translate requirements and comments into working code</a:t>
-            </a:r>
-          </a:p>
-          <a:p>
-            <a:r>
-              <a:rPr lang="en-US" b="1" dirty="0"/>
               <a:t>Contextual Awareness</a:t>
             </a:r>
             <a:r>
@@ -6819,6 +6799,26 @@
             <a:r>
               <a:rPr lang="en-US" dirty="0"/>
               <a:t>: Enable quick generation of boilerplate code, tests, and common implementations</a:t>
+            </a:r>
+          </a:p>
+          <a:p>
+            <a:r>
+              <a:rPr lang="en-US" b="1" dirty="0"/>
+              <a:t>Pattern Recognition</a:t>
+            </a:r>
+            <a:r>
+              <a:rPr lang="en-US" dirty="0"/>
+              <a:t>: Excel at recognizing and reproducing common coding patterns from their training data or applying patterns from one part of the codebase to another</a:t>
+            </a:r>
+          </a:p>
+          <a:p>
+            <a:r>
+              <a:rPr lang="en-US" b="1" dirty="0"/>
+              <a:t>Cross-Domain Transfer</a:t>
+            </a:r>
+            <a:r>
+              <a:rPr lang="en-US" dirty="0"/>
+              <a:t>: Can apply patterns from one domain or language to another</a:t>
             </a:r>
           </a:p>
           <a:p>
@@ -7377,7 +7377,7 @@
           <p:cNvPr id="2" name="Title 1">
             <a:extLst>
               <a:ext uri="{FF2B5EF4-FFF2-40B4-BE49-F238E27FC236}">
-                <a16:creationId xmlns:a16="http://schemas.microsoft.com/office/drawing/2014/main" id="{935FEBF8-DF43-99C2-5C42-03C5F8F5F493}"/>
+                <a16:creationId xmlns:a16="http://schemas.microsoft.com/office/drawing/2014/main" id="{F5871133-8BD4-A068-0ED7-7B0949F660FF}"/>
               </a:ext>
             </a:extLst>
           </p:cNvPr>
@@ -7395,7 +7395,7 @@
           <a:p>
             <a:r>
               <a:rPr lang="en-US" dirty="0"/>
-              <a:t>Engage: Design Artifacts to maintain</a:t>
+              <a:t>Organizing your prompts</a:t>
             </a:r>
           </a:p>
         </p:txBody>
@@ -7405,7 +7405,7 @@
           <p:cNvPr id="3" name="Content Placeholder 2">
             <a:extLst>
               <a:ext uri="{FF2B5EF4-FFF2-40B4-BE49-F238E27FC236}">
-                <a16:creationId xmlns:a16="http://schemas.microsoft.com/office/drawing/2014/main" id="{8D9AEB9E-DAC2-F6FD-C3FA-58A35C316A6E}"/>
+                <a16:creationId xmlns:a16="http://schemas.microsoft.com/office/drawing/2014/main" id="{33BF0666-EE4C-0C0D-CAF9-F42E415E6C15}"/>
               </a:ext>
             </a:extLst>
           </p:cNvPr>
@@ -7422,51 +7422,30 @@
           <a:lstStyle/>
           <a:p>
             <a:r>
-              <a:rPr lang="en-US" b="1" dirty="0"/>
-              <a:t>PLAN.md</a:t>
-            </a:r>
-            <a:r>
-              <a:rPr lang="en-US" dirty="0"/>
-              <a:t>: High-level project plan, requirements, user stories, and implementation phases</a:t>
-            </a:r>
-          </a:p>
-          <a:p>
-            <a:r>
-              <a:rPr lang="en-US" b="1" dirty="0"/>
-              <a:t>DESIGN.md</a:t>
-            </a:r>
-            <a:r>
-              <a:rPr lang="en-US" dirty="0"/>
-              <a:t> or </a:t>
-            </a:r>
-            <a:r>
-              <a:rPr lang="en-US" b="1" dirty="0"/>
-              <a:t>MODEL.md</a:t>
-            </a:r>
-            <a:r>
-              <a:rPr lang="en-US" dirty="0"/>
-              <a:t>: Data models, architecture decisions, design patterns, and alternatives considered</a:t>
-            </a:r>
-          </a:p>
-          <a:p>
-            <a:r>
-              <a:rPr lang="en-US" b="1" dirty="0"/>
-              <a:t>REQUIREMENTS.md</a:t>
-            </a:r>
-            <a:r>
-              <a:rPr lang="en-US" dirty="0"/>
-              <a:t>: Detailed functional and non-functional requirements, constraints, and acceptance criteria</a:t>
-            </a:r>
-          </a:p>
-          <a:p>
-            <a:r>
-              <a:rPr lang="en-US" b="1" dirty="0"/>
-              <a:t>DECISIONS.md</a:t>
-            </a:r>
-            <a:r>
-              <a:rPr lang="en-US" dirty="0"/>
-              <a:t>: Records of key architectural and design decisions, including rationale</a:t>
-            </a:r>
+              <a:rPr lang="en-US" dirty="0"/>
+              <a:t>The prompt is the way you give the AI instructions at the start of a project</a:t>
+            </a:r>
+          </a:p>
+          <a:p>
+            <a:r>
+              <a:rPr lang="en-US" dirty="0"/>
+              <a:t>Typically a set of .md files</a:t>
+            </a:r>
+          </a:p>
+          <a:p>
+            <a:r>
+              <a:rPr lang="en-US" dirty="0"/>
+              <a:t>In a place that your particular AI recognizes.</a:t>
+            </a:r>
+          </a:p>
+          <a:p>
+            <a:r>
+              <a:rPr lang="en-US" dirty="0"/>
+              <a:t>Probably a good idea to organize your prompts around your conditions of satisfaction</a:t>
+            </a:r>
+          </a:p>
+          <a:p>
+            <a:endParaRPr lang="en-US" dirty="0"/>
           </a:p>
         </p:txBody>
       </p:sp>
@@ -7475,7 +7454,7 @@
           <p:cNvPr id="4" name="Slide Number Placeholder 3">
             <a:extLst>
               <a:ext uri="{FF2B5EF4-FFF2-40B4-BE49-F238E27FC236}">
-                <a16:creationId xmlns:a16="http://schemas.microsoft.com/office/drawing/2014/main" id="{D688B5C4-4225-7B88-3B6F-B7DD2FB3B636}"/>
+                <a16:creationId xmlns:a16="http://schemas.microsoft.com/office/drawing/2014/main" id="{048E345A-A73C-824A-0DE8-396FB9D73EF3}"/>
               </a:ext>
             </a:extLst>
           </p:cNvPr>
@@ -7502,7 +7481,7 @@
     </p:spTree>
     <p:extLst>
       <p:ext uri="{BB962C8B-B14F-4D97-AF65-F5344CB8AC3E}">
-        <p14:creationId xmlns:p14="http://schemas.microsoft.com/office/powerpoint/2010/main" val="296734888"/>
+        <p14:creationId xmlns:p14="http://schemas.microsoft.com/office/powerpoint/2010/main" val="303404221"/>
       </p:ext>
     </p:extLst>
   </p:cSld>
@@ -7534,7 +7513,7 @@
           <p:cNvPr id="2" name="Title 1">
             <a:extLst>
               <a:ext uri="{FF2B5EF4-FFF2-40B4-BE49-F238E27FC236}">
-                <a16:creationId xmlns:a16="http://schemas.microsoft.com/office/drawing/2014/main" id="{F5871133-8BD4-A068-0ED7-7B0949F660FF}"/>
+                <a16:creationId xmlns:a16="http://schemas.microsoft.com/office/drawing/2014/main" id="{935FEBF8-DF43-99C2-5C42-03C5F8F5F493}"/>
               </a:ext>
             </a:extLst>
           </p:cNvPr>
@@ -7552,7 +7531,7 @@
           <a:p>
             <a:r>
               <a:rPr lang="en-US" dirty="0"/>
-              <a:t>Organizing your prompts</a:t>
+              <a:t>Engage: Design Artifacts to maintain</a:t>
             </a:r>
           </a:p>
         </p:txBody>
@@ -7562,7 +7541,7 @@
           <p:cNvPr id="3" name="Content Placeholder 2">
             <a:extLst>
               <a:ext uri="{FF2B5EF4-FFF2-40B4-BE49-F238E27FC236}">
-                <a16:creationId xmlns:a16="http://schemas.microsoft.com/office/drawing/2014/main" id="{33BF0666-EE4C-0C0D-CAF9-F42E415E6C15}"/>
+                <a16:creationId xmlns:a16="http://schemas.microsoft.com/office/drawing/2014/main" id="{8D9AEB9E-DAC2-F6FD-C3FA-58A35C316A6E}"/>
               </a:ext>
             </a:extLst>
           </p:cNvPr>
@@ -7579,30 +7558,51 @@
           <a:lstStyle/>
           <a:p>
             <a:r>
-              <a:rPr lang="en-US" dirty="0"/>
-              <a:t>The prompt is the way you give the AI instructions at the start of a project</a:t>
-            </a:r>
-          </a:p>
-          <a:p>
-            <a:r>
-              <a:rPr lang="en-US" dirty="0"/>
-              <a:t>Typically a set of .md files</a:t>
-            </a:r>
-          </a:p>
-          <a:p>
-            <a:r>
-              <a:rPr lang="en-US" dirty="0"/>
-              <a:t>In a place that your particular AI recognizes.</a:t>
-            </a:r>
-          </a:p>
-          <a:p>
-            <a:r>
-              <a:rPr lang="en-US" dirty="0"/>
-              <a:t>Probably a good idea to organize your prompts around your conditions of satisfaction</a:t>
-            </a:r>
-          </a:p>
-          <a:p>
-            <a:endParaRPr lang="en-US" dirty="0"/>
+              <a:rPr lang="en-US" b="1" dirty="0"/>
+              <a:t>PLAN.md</a:t>
+            </a:r>
+            <a:r>
+              <a:rPr lang="en-US" dirty="0"/>
+              <a:t>: High-level project plan, requirements, user stories, and implementation phases</a:t>
+            </a:r>
+          </a:p>
+          <a:p>
+            <a:r>
+              <a:rPr lang="en-US" b="1" dirty="0"/>
+              <a:t>DESIGN.md</a:t>
+            </a:r>
+            <a:r>
+              <a:rPr lang="en-US" dirty="0"/>
+              <a:t> or </a:t>
+            </a:r>
+            <a:r>
+              <a:rPr lang="en-US" b="1" dirty="0"/>
+              <a:t>MODEL.md</a:t>
+            </a:r>
+            <a:r>
+              <a:rPr lang="en-US" dirty="0"/>
+              <a:t>: Data models, architecture decisions, design patterns, and alternatives considered</a:t>
+            </a:r>
+          </a:p>
+          <a:p>
+            <a:r>
+              <a:rPr lang="en-US" b="1" dirty="0"/>
+              <a:t>REQUIREMENTS.md</a:t>
+            </a:r>
+            <a:r>
+              <a:rPr lang="en-US" dirty="0"/>
+              <a:t>: Detailed functional and non-functional requirements, constraints, and acceptance criteria</a:t>
+            </a:r>
+          </a:p>
+          <a:p>
+            <a:r>
+              <a:rPr lang="en-US" b="1" dirty="0"/>
+              <a:t>DECISIONS.md</a:t>
+            </a:r>
+            <a:r>
+              <a:rPr lang="en-US" dirty="0"/>
+              <a:t>: Records of key architectural and design decisions, including rationale</a:t>
+            </a:r>
           </a:p>
         </p:txBody>
       </p:sp>
@@ -7611,7 +7611,7 @@
           <p:cNvPr id="4" name="Slide Number Placeholder 3">
             <a:extLst>
               <a:ext uri="{FF2B5EF4-FFF2-40B4-BE49-F238E27FC236}">
-                <a16:creationId xmlns:a16="http://schemas.microsoft.com/office/drawing/2014/main" id="{048E345A-A73C-824A-0DE8-396FB9D73EF3}"/>
+                <a16:creationId xmlns:a16="http://schemas.microsoft.com/office/drawing/2014/main" id="{D688B5C4-4225-7B88-3B6F-B7DD2FB3B636}"/>
               </a:ext>
             </a:extLst>
           </p:cNvPr>
@@ -7638,7 +7638,7 @@
     </p:spTree>
     <p:extLst>
       <p:ext uri="{BB962C8B-B14F-4D97-AF65-F5344CB8AC3E}">
-        <p14:creationId xmlns:p14="http://schemas.microsoft.com/office/powerpoint/2010/main" val="303404221"/>
+        <p14:creationId xmlns:p14="http://schemas.microsoft.com/office/powerpoint/2010/main" val="296734888"/>
       </p:ext>
     </p:extLst>
   </p:cSld>
@@ -8602,7 +8602,7 @@
         <p:spPr>
           <a:xfrm>
             <a:off x="838200" y="1609080"/>
-            <a:ext cx="8308554" cy="5078313"/>
+            <a:ext cx="8308554" cy="5355312"/>
           </a:xfrm>
           <a:prstGeom prst="rect">
             <a:avLst/>
@@ -8645,6 +8645,600 @@
                 <a:solidFill>
                   <a:srgbClr val="800000"/>
                 </a:solidFill>
+                <a:latin typeface="Consolas" panose="020B0609020204030204" pitchFamily="49" charset="0"/>
+              </a:rPr>
+              <a:t>## Repository Structure</a:t>
+            </a:r>
+            <a:endParaRPr lang="en-US" dirty="0">
+              <a:solidFill>
+                <a:srgbClr val="3B3B3B"/>
+              </a:solidFill>
+              <a:latin typeface="Consolas" panose="020B0609020204030204" pitchFamily="49" charset="0"/>
+            </a:endParaRPr>
+          </a:p>
+          <a:p>
+            <a:pPr>
+              <a:buNone/>
+            </a:pPr>
+            <a:r>
+              <a:rPr lang="en-US" dirty="0">
+                <a:solidFill>
+                  <a:srgbClr val="0451A5"/>
+                </a:solidFill>
+                <a:latin typeface="Consolas" panose="020B0609020204030204" pitchFamily="49" charset="0"/>
+              </a:rPr>
+              <a:t>-</a:t>
+            </a:r>
+            <a:r>
+              <a:rPr lang="en-US" dirty="0">
+                <a:solidFill>
+                  <a:srgbClr val="3B3B3B"/>
+                </a:solidFill>
+                <a:latin typeface="Consolas" panose="020B0609020204030204" pitchFamily="49" charset="0"/>
+              </a:rPr>
+              <a:t> </a:t>
+            </a:r>
+            <a:r>
+              <a:rPr lang="en-US" dirty="0">
+                <a:solidFill>
+                  <a:srgbClr val="800000"/>
+                </a:solidFill>
+                <a:latin typeface="Consolas" panose="020B0609020204030204" pitchFamily="49" charset="0"/>
+              </a:rPr>
+              <a:t>`</a:t>
+            </a:r>
+            <a:r>
+              <a:rPr lang="en-US" dirty="0" err="1">
+                <a:solidFill>
+                  <a:srgbClr val="800000"/>
+                </a:solidFill>
+                <a:latin typeface="Consolas" panose="020B0609020204030204" pitchFamily="49" charset="0"/>
+              </a:rPr>
+              <a:t>src</a:t>
+            </a:r>
+            <a:r>
+              <a:rPr lang="en-US" dirty="0">
+                <a:solidFill>
+                  <a:srgbClr val="800000"/>
+                </a:solidFill>
+                <a:latin typeface="Consolas" panose="020B0609020204030204" pitchFamily="49" charset="0"/>
+              </a:rPr>
+              <a:t>/`</a:t>
+            </a:r>
+            <a:r>
+              <a:rPr lang="en-US" dirty="0">
+                <a:solidFill>
+                  <a:srgbClr val="3B3B3B"/>
+                </a:solidFill>
+                <a:latin typeface="Consolas" panose="020B0609020204030204" pitchFamily="49" charset="0"/>
+              </a:rPr>
+              <a:t> for source code</a:t>
+            </a:r>
+          </a:p>
+          <a:p>
+            <a:pPr>
+              <a:buNone/>
+            </a:pPr>
+            <a:r>
+              <a:rPr lang="en-US" dirty="0">
+                <a:solidFill>
+                  <a:srgbClr val="3B3B3B"/>
+                </a:solidFill>
+                <a:latin typeface="Consolas" panose="020B0609020204030204" pitchFamily="49" charset="0"/>
+              </a:rPr>
+              <a:t>  </a:t>
+            </a:r>
+            <a:r>
+              <a:rPr lang="en-US" dirty="0">
+                <a:solidFill>
+                  <a:srgbClr val="0451A5"/>
+                </a:solidFill>
+                <a:latin typeface="Consolas" panose="020B0609020204030204" pitchFamily="49" charset="0"/>
+              </a:rPr>
+              <a:t>-</a:t>
+            </a:r>
+            <a:r>
+              <a:rPr lang="en-US" dirty="0">
+                <a:solidFill>
+                  <a:srgbClr val="3B3B3B"/>
+                </a:solidFill>
+                <a:latin typeface="Consolas" panose="020B0609020204030204" pitchFamily="49" charset="0"/>
+              </a:rPr>
+              <a:t> </a:t>
+            </a:r>
+            <a:r>
+              <a:rPr lang="en-US" dirty="0">
+                <a:solidFill>
+                  <a:srgbClr val="800000"/>
+                </a:solidFill>
+                <a:latin typeface="Consolas" panose="020B0609020204030204" pitchFamily="49" charset="0"/>
+              </a:rPr>
+              <a:t>`</a:t>
+            </a:r>
+            <a:r>
+              <a:rPr lang="en-US" dirty="0" err="1">
+                <a:solidFill>
+                  <a:srgbClr val="800000"/>
+                </a:solidFill>
+                <a:latin typeface="Consolas" panose="020B0609020204030204" pitchFamily="49" charset="0"/>
+              </a:rPr>
+              <a:t>additionService.ts</a:t>
+            </a:r>
+            <a:r>
+              <a:rPr lang="en-US" dirty="0">
+                <a:solidFill>
+                  <a:srgbClr val="800000"/>
+                </a:solidFill>
+                <a:latin typeface="Consolas" panose="020B0609020204030204" pitchFamily="49" charset="0"/>
+              </a:rPr>
+              <a:t>`</a:t>
+            </a:r>
+            <a:r>
+              <a:rPr lang="en-US" dirty="0">
+                <a:solidFill>
+                  <a:srgbClr val="3B3B3B"/>
+                </a:solidFill>
+                <a:latin typeface="Consolas" panose="020B0609020204030204" pitchFamily="49" charset="0"/>
+              </a:rPr>
+              <a:t> for business logic</a:t>
+            </a:r>
+          </a:p>
+          <a:p>
+            <a:pPr>
+              <a:buNone/>
+            </a:pPr>
+            <a:r>
+              <a:rPr lang="en-US" dirty="0">
+                <a:solidFill>
+                  <a:srgbClr val="3B3B3B"/>
+                </a:solidFill>
+                <a:latin typeface="Consolas" panose="020B0609020204030204" pitchFamily="49" charset="0"/>
+              </a:rPr>
+              <a:t>  </a:t>
+            </a:r>
+            <a:r>
+              <a:rPr lang="en-US" dirty="0">
+                <a:solidFill>
+                  <a:srgbClr val="0451A5"/>
+                </a:solidFill>
+                <a:latin typeface="Consolas" panose="020B0609020204030204" pitchFamily="49" charset="0"/>
+              </a:rPr>
+              <a:t>-</a:t>
+            </a:r>
+            <a:r>
+              <a:rPr lang="en-US" dirty="0">
+                <a:solidFill>
+                  <a:srgbClr val="3B3B3B"/>
+                </a:solidFill>
+                <a:latin typeface="Consolas" panose="020B0609020204030204" pitchFamily="49" charset="0"/>
+              </a:rPr>
+              <a:t> </a:t>
+            </a:r>
+            <a:r>
+              <a:rPr lang="en-US" dirty="0">
+                <a:solidFill>
+                  <a:srgbClr val="800000"/>
+                </a:solidFill>
+                <a:latin typeface="Consolas" panose="020B0609020204030204" pitchFamily="49" charset="0"/>
+              </a:rPr>
+              <a:t>`</a:t>
+            </a:r>
+            <a:r>
+              <a:rPr lang="en-US" dirty="0" err="1">
+                <a:solidFill>
+                  <a:srgbClr val="800000"/>
+                </a:solidFill>
+                <a:latin typeface="Consolas" panose="020B0609020204030204" pitchFamily="49" charset="0"/>
+              </a:rPr>
+              <a:t>additionController.ts</a:t>
+            </a:r>
+            <a:r>
+              <a:rPr lang="en-US" dirty="0">
+                <a:solidFill>
+                  <a:srgbClr val="800000"/>
+                </a:solidFill>
+                <a:latin typeface="Consolas" panose="020B0609020204030204" pitchFamily="49" charset="0"/>
+              </a:rPr>
+              <a:t>`</a:t>
+            </a:r>
+            <a:r>
+              <a:rPr lang="en-US" dirty="0">
+                <a:solidFill>
+                  <a:srgbClr val="3B3B3B"/>
+                </a:solidFill>
+                <a:latin typeface="Consolas" panose="020B0609020204030204" pitchFamily="49" charset="0"/>
+              </a:rPr>
+              <a:t> for handling requests</a:t>
+            </a:r>
+          </a:p>
+          <a:p>
+            <a:pPr>
+              <a:buNone/>
+            </a:pPr>
+            <a:r>
+              <a:rPr lang="en-US" dirty="0">
+                <a:solidFill>
+                  <a:srgbClr val="3B3B3B"/>
+                </a:solidFill>
+                <a:latin typeface="Consolas" panose="020B0609020204030204" pitchFamily="49" charset="0"/>
+              </a:rPr>
+              <a:t>  </a:t>
+            </a:r>
+            <a:r>
+              <a:rPr lang="en-US" dirty="0">
+                <a:solidFill>
+                  <a:srgbClr val="0451A5"/>
+                </a:solidFill>
+                <a:latin typeface="Consolas" panose="020B0609020204030204" pitchFamily="49" charset="0"/>
+              </a:rPr>
+              <a:t>-</a:t>
+            </a:r>
+            <a:r>
+              <a:rPr lang="en-US" dirty="0">
+                <a:solidFill>
+                  <a:srgbClr val="3B3B3B"/>
+                </a:solidFill>
+                <a:latin typeface="Consolas" panose="020B0609020204030204" pitchFamily="49" charset="0"/>
+              </a:rPr>
+              <a:t> </a:t>
+            </a:r>
+            <a:r>
+              <a:rPr lang="en-US" dirty="0">
+                <a:solidFill>
+                  <a:srgbClr val="800000"/>
+                </a:solidFill>
+                <a:latin typeface="Consolas" panose="020B0609020204030204" pitchFamily="49" charset="0"/>
+              </a:rPr>
+              <a:t>`*.</a:t>
+            </a:r>
+            <a:r>
+              <a:rPr lang="en-US" dirty="0" err="1">
+                <a:solidFill>
+                  <a:srgbClr val="800000"/>
+                </a:solidFill>
+                <a:latin typeface="Consolas" panose="020B0609020204030204" pitchFamily="49" charset="0"/>
+              </a:rPr>
+              <a:t>test.ts</a:t>
+            </a:r>
+            <a:r>
+              <a:rPr lang="en-US" dirty="0">
+                <a:solidFill>
+                  <a:srgbClr val="800000"/>
+                </a:solidFill>
+                <a:latin typeface="Consolas" panose="020B0609020204030204" pitchFamily="49" charset="0"/>
+              </a:rPr>
+              <a:t>`</a:t>
+            </a:r>
+            <a:r>
+              <a:rPr lang="en-US" dirty="0">
+                <a:solidFill>
+                  <a:srgbClr val="3B3B3B"/>
+                </a:solidFill>
+                <a:latin typeface="Consolas" panose="020B0609020204030204" pitchFamily="49" charset="0"/>
+              </a:rPr>
+              <a:t> for tests</a:t>
+            </a:r>
+          </a:p>
+          <a:p>
+            <a:pPr>
+              <a:buNone/>
+            </a:pPr>
+            <a:r>
+              <a:rPr lang="en-US" dirty="0">
+                <a:solidFill>
+                  <a:srgbClr val="3B3B3B"/>
+                </a:solidFill>
+                <a:latin typeface="Consolas" panose="020B0609020204030204" pitchFamily="49" charset="0"/>
+              </a:rPr>
+              <a:t>  </a:t>
+            </a:r>
+            <a:r>
+              <a:rPr lang="en-US" dirty="0">
+                <a:solidFill>
+                  <a:srgbClr val="0451A5"/>
+                </a:solidFill>
+                <a:latin typeface="Consolas" panose="020B0609020204030204" pitchFamily="49" charset="0"/>
+              </a:rPr>
+              <a:t>-</a:t>
+            </a:r>
+            <a:r>
+              <a:rPr lang="en-US" dirty="0">
+                <a:solidFill>
+                  <a:srgbClr val="3B3B3B"/>
+                </a:solidFill>
+                <a:latin typeface="Consolas" panose="020B0609020204030204" pitchFamily="49" charset="0"/>
+              </a:rPr>
+              <a:t> </a:t>
+            </a:r>
+            <a:r>
+              <a:rPr lang="en-US" dirty="0">
+                <a:solidFill>
+                  <a:srgbClr val="800000"/>
+                </a:solidFill>
+                <a:latin typeface="Consolas" panose="020B0609020204030204" pitchFamily="49" charset="0"/>
+              </a:rPr>
+              <a:t>`</a:t>
+            </a:r>
+            <a:r>
+              <a:rPr lang="en-US" dirty="0" err="1">
+                <a:solidFill>
+                  <a:srgbClr val="800000"/>
+                </a:solidFill>
+                <a:latin typeface="Consolas" panose="020B0609020204030204" pitchFamily="49" charset="0"/>
+              </a:rPr>
+              <a:t>scratchpad.ts</a:t>
+            </a:r>
+            <a:r>
+              <a:rPr lang="en-US" dirty="0">
+                <a:solidFill>
+                  <a:srgbClr val="800000"/>
+                </a:solidFill>
+                <a:latin typeface="Consolas" panose="020B0609020204030204" pitchFamily="49" charset="0"/>
+              </a:rPr>
+              <a:t>`</a:t>
+            </a:r>
+            <a:r>
+              <a:rPr lang="en-US" dirty="0">
+                <a:solidFill>
+                  <a:srgbClr val="3B3B3B"/>
+                </a:solidFill>
+                <a:latin typeface="Consolas" panose="020B0609020204030204" pitchFamily="49" charset="0"/>
+              </a:rPr>
+              <a:t> for experimental code</a:t>
+            </a:r>
+          </a:p>
+          <a:p>
+            <a:pPr>
+              <a:buNone/>
+            </a:pPr>
+            <a:r>
+              <a:rPr lang="en-US" dirty="0">
+                <a:solidFill>
+                  <a:srgbClr val="3B3B3B"/>
+                </a:solidFill>
+                <a:latin typeface="Consolas" panose="020B0609020204030204" pitchFamily="49" charset="0"/>
+              </a:rPr>
+              <a:t>  </a:t>
+            </a:r>
+            <a:r>
+              <a:rPr lang="en-US" dirty="0">
+                <a:solidFill>
+                  <a:srgbClr val="0451A5"/>
+                </a:solidFill>
+                <a:latin typeface="Consolas" panose="020B0609020204030204" pitchFamily="49" charset="0"/>
+              </a:rPr>
+              <a:t>-</a:t>
+            </a:r>
+            <a:r>
+              <a:rPr lang="en-US" dirty="0">
+                <a:solidFill>
+                  <a:srgbClr val="3B3B3B"/>
+                </a:solidFill>
+                <a:latin typeface="Consolas" panose="020B0609020204030204" pitchFamily="49" charset="0"/>
+              </a:rPr>
+              <a:t> </a:t>
+            </a:r>
+            <a:r>
+              <a:rPr lang="en-US" dirty="0">
+                <a:solidFill>
+                  <a:srgbClr val="800000"/>
+                </a:solidFill>
+                <a:latin typeface="Consolas" panose="020B0609020204030204" pitchFamily="49" charset="0"/>
+              </a:rPr>
+              <a:t>`</a:t>
+            </a:r>
+            <a:r>
+              <a:rPr lang="en-US" dirty="0" err="1">
+                <a:solidFill>
+                  <a:srgbClr val="800000"/>
+                </a:solidFill>
+                <a:latin typeface="Consolas" panose="020B0609020204030204" pitchFamily="49" charset="0"/>
+              </a:rPr>
+              <a:t>express.ts</a:t>
+            </a:r>
+            <a:r>
+              <a:rPr lang="en-US" dirty="0">
+                <a:solidFill>
+                  <a:srgbClr val="800000"/>
+                </a:solidFill>
+                <a:latin typeface="Consolas" panose="020B0609020204030204" pitchFamily="49" charset="0"/>
+              </a:rPr>
+              <a:t>`</a:t>
+            </a:r>
+            <a:r>
+              <a:rPr lang="en-US" dirty="0">
+                <a:solidFill>
+                  <a:srgbClr val="3B3B3B"/>
+                </a:solidFill>
+                <a:latin typeface="Consolas" panose="020B0609020204030204" pitchFamily="49" charset="0"/>
+              </a:rPr>
+              <a:t> for express app setup</a:t>
+            </a:r>
+          </a:p>
+          <a:p>
+            <a:pPr>
+              <a:buNone/>
+            </a:pPr>
+            <a:r>
+              <a:rPr lang="en-US" dirty="0">
+                <a:solidFill>
+                  <a:srgbClr val="3B3B3B"/>
+                </a:solidFill>
+                <a:latin typeface="Consolas" panose="020B0609020204030204" pitchFamily="49" charset="0"/>
+              </a:rPr>
+              <a:t>  </a:t>
+            </a:r>
+            <a:r>
+              <a:rPr lang="en-US" dirty="0">
+                <a:solidFill>
+                  <a:srgbClr val="0451A5"/>
+                </a:solidFill>
+                <a:latin typeface="Consolas" panose="020B0609020204030204" pitchFamily="49" charset="0"/>
+              </a:rPr>
+              <a:t>-</a:t>
+            </a:r>
+            <a:r>
+              <a:rPr lang="en-US" dirty="0">
+                <a:solidFill>
+                  <a:srgbClr val="3B3B3B"/>
+                </a:solidFill>
+                <a:latin typeface="Consolas" panose="020B0609020204030204" pitchFamily="49" charset="0"/>
+              </a:rPr>
+              <a:t> </a:t>
+            </a:r>
+            <a:r>
+              <a:rPr lang="en-US" dirty="0">
+                <a:solidFill>
+                  <a:srgbClr val="0451A5"/>
+                </a:solidFill>
+                <a:latin typeface="Consolas" panose="020B0609020204030204" pitchFamily="49" charset="0"/>
+              </a:rPr>
+              <a:t>-</a:t>
+            </a:r>
+            <a:r>
+              <a:rPr lang="en-US" dirty="0">
+                <a:solidFill>
+                  <a:srgbClr val="3B3B3B"/>
+                </a:solidFill>
+                <a:latin typeface="Consolas" panose="020B0609020204030204" pitchFamily="49" charset="0"/>
+              </a:rPr>
+              <a:t> </a:t>
+            </a:r>
+            <a:r>
+              <a:rPr lang="en-US" dirty="0">
+                <a:solidFill>
+                  <a:srgbClr val="800000"/>
+                </a:solidFill>
+                <a:latin typeface="Consolas" panose="020B0609020204030204" pitchFamily="49" charset="0"/>
+              </a:rPr>
+              <a:t>`</a:t>
+            </a:r>
+            <a:r>
+              <a:rPr lang="en-US" dirty="0" err="1">
+                <a:solidFill>
+                  <a:srgbClr val="800000"/>
+                </a:solidFill>
+                <a:latin typeface="Consolas" panose="020B0609020204030204" pitchFamily="49" charset="0"/>
+              </a:rPr>
+              <a:t>src</a:t>
+            </a:r>
+            <a:r>
+              <a:rPr lang="en-US" dirty="0">
+                <a:solidFill>
+                  <a:srgbClr val="800000"/>
+                </a:solidFill>
+                <a:latin typeface="Consolas" panose="020B0609020204030204" pitchFamily="49" charset="0"/>
+              </a:rPr>
+              <a:t>/</a:t>
+            </a:r>
+            <a:r>
+              <a:rPr lang="en-US" dirty="0" err="1">
+                <a:solidFill>
+                  <a:srgbClr val="800000"/>
+                </a:solidFill>
+                <a:latin typeface="Consolas" panose="020B0609020204030204" pitchFamily="49" charset="0"/>
+              </a:rPr>
+              <a:t>server.ts</a:t>
+            </a:r>
+            <a:r>
+              <a:rPr lang="en-US" dirty="0">
+                <a:solidFill>
+                  <a:srgbClr val="800000"/>
+                </a:solidFill>
+                <a:latin typeface="Consolas" panose="020B0609020204030204" pitchFamily="49" charset="0"/>
+              </a:rPr>
+              <a:t>`</a:t>
+            </a:r>
+            <a:r>
+              <a:rPr lang="en-US" dirty="0">
+                <a:solidFill>
+                  <a:srgbClr val="3B3B3B"/>
+                </a:solidFill>
+                <a:latin typeface="Consolas" panose="020B0609020204030204" pitchFamily="49" charset="0"/>
+              </a:rPr>
+              <a:t> to start the application</a:t>
+            </a:r>
+          </a:p>
+          <a:p>
+            <a:pPr>
+              <a:buNone/>
+            </a:pPr>
+            <a:r>
+              <a:rPr lang="en-US" dirty="0">
+                <a:solidFill>
+                  <a:srgbClr val="0451A5"/>
+                </a:solidFill>
+                <a:latin typeface="Consolas" panose="020B0609020204030204" pitchFamily="49" charset="0"/>
+              </a:rPr>
+              <a:t>-</a:t>
+            </a:r>
+            <a:r>
+              <a:rPr lang="en-US" dirty="0">
+                <a:solidFill>
+                  <a:srgbClr val="3B3B3B"/>
+                </a:solidFill>
+                <a:latin typeface="Consolas" panose="020B0609020204030204" pitchFamily="49" charset="0"/>
+              </a:rPr>
+              <a:t> </a:t>
+            </a:r>
+            <a:r>
+              <a:rPr lang="en-US" dirty="0">
+                <a:solidFill>
+                  <a:srgbClr val="800000"/>
+                </a:solidFill>
+                <a:latin typeface="Consolas" panose="020B0609020204030204" pitchFamily="49" charset="0"/>
+              </a:rPr>
+              <a:t>`</a:t>
+            </a:r>
+            <a:r>
+              <a:rPr lang="en-US" dirty="0" err="1">
+                <a:solidFill>
+                  <a:srgbClr val="800000"/>
+                </a:solidFill>
+                <a:latin typeface="Consolas" panose="020B0609020204030204" pitchFamily="49" charset="0"/>
+              </a:rPr>
+              <a:t>package.json</a:t>
+            </a:r>
+            <a:r>
+              <a:rPr lang="en-US" dirty="0">
+                <a:solidFill>
+                  <a:srgbClr val="800000"/>
+                </a:solidFill>
+                <a:latin typeface="Consolas" panose="020B0609020204030204" pitchFamily="49" charset="0"/>
+              </a:rPr>
+              <a:t>`</a:t>
+            </a:r>
+            <a:r>
+              <a:rPr lang="en-US" dirty="0">
+                <a:solidFill>
+                  <a:srgbClr val="3B3B3B"/>
+                </a:solidFill>
+                <a:latin typeface="Consolas" panose="020B0609020204030204" pitchFamily="49" charset="0"/>
+              </a:rPr>
+              <a:t> for dependencies and scripts</a:t>
+            </a:r>
+          </a:p>
+          <a:p>
+            <a:pPr>
+              <a:buNone/>
+            </a:pPr>
+            <a:endParaRPr lang="en-US" b="1" dirty="0">
+              <a:solidFill>
+                <a:srgbClr val="800000"/>
+              </a:solidFill>
+              <a:effectLst/>
+              <a:latin typeface="Consolas" panose="020B0609020204030204" pitchFamily="49" charset="0"/>
+            </a:endParaRPr>
+          </a:p>
+          <a:p>
+            <a:pPr>
+              <a:buNone/>
+            </a:pPr>
+            <a:r>
+              <a:rPr lang="en-US" b="1" dirty="0">
+                <a:solidFill>
+                  <a:srgbClr val="800000"/>
+                </a:solidFill>
                 <a:effectLst/>
                 <a:latin typeface="Consolas" panose="020B0609020204030204" pitchFamily="49" charset="0"/>
               </a:rPr>
@@ -8778,648 +9372,6 @@
               <a:effectLst/>
               <a:latin typeface="Consolas" panose="020B0609020204030204" pitchFamily="49" charset="0"/>
             </a:endParaRPr>
-          </a:p>
-          <a:p>
-            <a:pPr>
-              <a:buNone/>
-            </a:pPr>
-            <a:r>
-              <a:rPr lang="en-US" b="1" dirty="0">
-                <a:solidFill>
-                  <a:srgbClr val="800000"/>
-                </a:solidFill>
-                <a:effectLst/>
-                <a:latin typeface="Consolas" panose="020B0609020204030204" pitchFamily="49" charset="0"/>
-              </a:rPr>
-              <a:t>## Repository Structure</a:t>
-            </a:r>
-            <a:endParaRPr lang="en-US" b="0" dirty="0">
-              <a:solidFill>
-                <a:srgbClr val="3B3B3B"/>
-              </a:solidFill>
-              <a:effectLst/>
-              <a:latin typeface="Consolas" panose="020B0609020204030204" pitchFamily="49" charset="0"/>
-            </a:endParaRPr>
-          </a:p>
-          <a:p>
-            <a:pPr>
-              <a:buNone/>
-            </a:pPr>
-            <a:r>
-              <a:rPr lang="en-US" b="0" dirty="0">
-                <a:solidFill>
-                  <a:srgbClr val="0451A5"/>
-                </a:solidFill>
-                <a:effectLst/>
-                <a:latin typeface="Consolas" panose="020B0609020204030204" pitchFamily="49" charset="0"/>
-              </a:rPr>
-              <a:t>-</a:t>
-            </a:r>
-            <a:r>
-              <a:rPr lang="en-US" b="0" dirty="0">
-                <a:solidFill>
-                  <a:srgbClr val="3B3B3B"/>
-                </a:solidFill>
-                <a:effectLst/>
-                <a:latin typeface="Consolas" panose="020B0609020204030204" pitchFamily="49" charset="0"/>
-              </a:rPr>
-              <a:t> </a:t>
-            </a:r>
-            <a:r>
-              <a:rPr lang="en-US" b="0" dirty="0">
-                <a:solidFill>
-                  <a:srgbClr val="800000"/>
-                </a:solidFill>
-                <a:effectLst/>
-                <a:latin typeface="Consolas" panose="020B0609020204030204" pitchFamily="49" charset="0"/>
-              </a:rPr>
-              <a:t>`</a:t>
-            </a:r>
-            <a:r>
-              <a:rPr lang="en-US" b="0" dirty="0" err="1">
-                <a:solidFill>
-                  <a:srgbClr val="800000"/>
-                </a:solidFill>
-                <a:effectLst/>
-                <a:latin typeface="Consolas" panose="020B0609020204030204" pitchFamily="49" charset="0"/>
-              </a:rPr>
-              <a:t>src</a:t>
-            </a:r>
-            <a:r>
-              <a:rPr lang="en-US" b="0" dirty="0">
-                <a:solidFill>
-                  <a:srgbClr val="800000"/>
-                </a:solidFill>
-                <a:effectLst/>
-                <a:latin typeface="Consolas" panose="020B0609020204030204" pitchFamily="49" charset="0"/>
-              </a:rPr>
-              <a:t>/`</a:t>
-            </a:r>
-            <a:r>
-              <a:rPr lang="en-US" b="0" dirty="0">
-                <a:solidFill>
-                  <a:srgbClr val="3B3B3B"/>
-                </a:solidFill>
-                <a:effectLst/>
-                <a:latin typeface="Consolas" panose="020B0609020204030204" pitchFamily="49" charset="0"/>
-              </a:rPr>
-              <a:t> for source code</a:t>
-            </a:r>
-          </a:p>
-          <a:p>
-            <a:pPr>
-              <a:buNone/>
-            </a:pPr>
-            <a:r>
-              <a:rPr lang="en-US" b="0" dirty="0">
-                <a:solidFill>
-                  <a:srgbClr val="3B3B3B"/>
-                </a:solidFill>
-                <a:effectLst/>
-                <a:latin typeface="Consolas" panose="020B0609020204030204" pitchFamily="49" charset="0"/>
-              </a:rPr>
-              <a:t>  </a:t>
-            </a:r>
-            <a:r>
-              <a:rPr lang="en-US" b="0" dirty="0">
-                <a:solidFill>
-                  <a:srgbClr val="0451A5"/>
-                </a:solidFill>
-                <a:effectLst/>
-                <a:latin typeface="Consolas" panose="020B0609020204030204" pitchFamily="49" charset="0"/>
-              </a:rPr>
-              <a:t>-</a:t>
-            </a:r>
-            <a:r>
-              <a:rPr lang="en-US" b="0" dirty="0">
-                <a:solidFill>
-                  <a:srgbClr val="3B3B3B"/>
-                </a:solidFill>
-                <a:effectLst/>
-                <a:latin typeface="Consolas" panose="020B0609020204030204" pitchFamily="49" charset="0"/>
-              </a:rPr>
-              <a:t> </a:t>
-            </a:r>
-            <a:r>
-              <a:rPr lang="en-US" b="0" dirty="0">
-                <a:solidFill>
-                  <a:srgbClr val="800000"/>
-                </a:solidFill>
-                <a:effectLst/>
-                <a:latin typeface="Consolas" panose="020B0609020204030204" pitchFamily="49" charset="0"/>
-              </a:rPr>
-              <a:t>`</a:t>
-            </a:r>
-            <a:r>
-              <a:rPr lang="en-US" b="0" dirty="0" err="1">
-                <a:solidFill>
-                  <a:srgbClr val="800000"/>
-                </a:solidFill>
-                <a:effectLst/>
-                <a:latin typeface="Consolas" panose="020B0609020204030204" pitchFamily="49" charset="0"/>
-              </a:rPr>
-              <a:t>additionService.ts</a:t>
-            </a:r>
-            <a:r>
-              <a:rPr lang="en-US" b="0" dirty="0">
-                <a:solidFill>
-                  <a:srgbClr val="800000"/>
-                </a:solidFill>
-                <a:effectLst/>
-                <a:latin typeface="Consolas" panose="020B0609020204030204" pitchFamily="49" charset="0"/>
-              </a:rPr>
-              <a:t>`</a:t>
-            </a:r>
-            <a:r>
-              <a:rPr lang="en-US" b="0" dirty="0">
-                <a:solidFill>
-                  <a:srgbClr val="3B3B3B"/>
-                </a:solidFill>
-                <a:effectLst/>
-                <a:latin typeface="Consolas" panose="020B0609020204030204" pitchFamily="49" charset="0"/>
-              </a:rPr>
-              <a:t> for business logic</a:t>
-            </a:r>
-          </a:p>
-          <a:p>
-            <a:pPr>
-              <a:buNone/>
-            </a:pPr>
-            <a:r>
-              <a:rPr lang="en-US" b="0" dirty="0">
-                <a:solidFill>
-                  <a:srgbClr val="3B3B3B"/>
-                </a:solidFill>
-                <a:effectLst/>
-                <a:latin typeface="Consolas" panose="020B0609020204030204" pitchFamily="49" charset="0"/>
-              </a:rPr>
-              <a:t>  </a:t>
-            </a:r>
-            <a:r>
-              <a:rPr lang="en-US" b="0" dirty="0">
-                <a:solidFill>
-                  <a:srgbClr val="0451A5"/>
-                </a:solidFill>
-                <a:effectLst/>
-                <a:latin typeface="Consolas" panose="020B0609020204030204" pitchFamily="49" charset="0"/>
-              </a:rPr>
-              <a:t>-</a:t>
-            </a:r>
-            <a:r>
-              <a:rPr lang="en-US" b="0" dirty="0">
-                <a:solidFill>
-                  <a:srgbClr val="3B3B3B"/>
-                </a:solidFill>
-                <a:effectLst/>
-                <a:latin typeface="Consolas" panose="020B0609020204030204" pitchFamily="49" charset="0"/>
-              </a:rPr>
-              <a:t> </a:t>
-            </a:r>
-            <a:r>
-              <a:rPr lang="en-US" b="0" dirty="0">
-                <a:solidFill>
-                  <a:srgbClr val="800000"/>
-                </a:solidFill>
-                <a:effectLst/>
-                <a:latin typeface="Consolas" panose="020B0609020204030204" pitchFamily="49" charset="0"/>
-              </a:rPr>
-              <a:t>`</a:t>
-            </a:r>
-            <a:r>
-              <a:rPr lang="en-US" b="0" dirty="0" err="1">
-                <a:solidFill>
-                  <a:srgbClr val="800000"/>
-                </a:solidFill>
-                <a:effectLst/>
-                <a:latin typeface="Consolas" panose="020B0609020204030204" pitchFamily="49" charset="0"/>
-              </a:rPr>
-              <a:t>additionController.ts</a:t>
-            </a:r>
-            <a:r>
-              <a:rPr lang="en-US" b="0" dirty="0">
-                <a:solidFill>
-                  <a:srgbClr val="800000"/>
-                </a:solidFill>
-                <a:effectLst/>
-                <a:latin typeface="Consolas" panose="020B0609020204030204" pitchFamily="49" charset="0"/>
-              </a:rPr>
-              <a:t>`</a:t>
-            </a:r>
-            <a:r>
-              <a:rPr lang="en-US" b="0" dirty="0">
-                <a:solidFill>
-                  <a:srgbClr val="3B3B3B"/>
-                </a:solidFill>
-                <a:effectLst/>
-                <a:latin typeface="Consolas" panose="020B0609020204030204" pitchFamily="49" charset="0"/>
-              </a:rPr>
-              <a:t> for handling requests</a:t>
-            </a:r>
-          </a:p>
-          <a:p>
-            <a:pPr>
-              <a:buNone/>
-            </a:pPr>
-            <a:r>
-              <a:rPr lang="en-US" b="0" dirty="0">
-                <a:solidFill>
-                  <a:srgbClr val="3B3B3B"/>
-                </a:solidFill>
-                <a:effectLst/>
-                <a:latin typeface="Consolas" panose="020B0609020204030204" pitchFamily="49" charset="0"/>
-              </a:rPr>
-              <a:t>  </a:t>
-            </a:r>
-            <a:r>
-              <a:rPr lang="en-US" b="0" dirty="0">
-                <a:solidFill>
-                  <a:srgbClr val="0451A5"/>
-                </a:solidFill>
-                <a:effectLst/>
-                <a:latin typeface="Consolas" panose="020B0609020204030204" pitchFamily="49" charset="0"/>
-              </a:rPr>
-              <a:t>-</a:t>
-            </a:r>
-            <a:r>
-              <a:rPr lang="en-US" b="0" dirty="0">
-                <a:solidFill>
-                  <a:srgbClr val="3B3B3B"/>
-                </a:solidFill>
-                <a:effectLst/>
-                <a:latin typeface="Consolas" panose="020B0609020204030204" pitchFamily="49" charset="0"/>
-              </a:rPr>
-              <a:t> </a:t>
-            </a:r>
-            <a:r>
-              <a:rPr lang="en-US" b="0" dirty="0">
-                <a:solidFill>
-                  <a:srgbClr val="800000"/>
-                </a:solidFill>
-                <a:effectLst/>
-                <a:latin typeface="Consolas" panose="020B0609020204030204" pitchFamily="49" charset="0"/>
-              </a:rPr>
-              <a:t>`*.</a:t>
-            </a:r>
-            <a:r>
-              <a:rPr lang="en-US" b="0" dirty="0" err="1">
-                <a:solidFill>
-                  <a:srgbClr val="800000"/>
-                </a:solidFill>
-                <a:effectLst/>
-                <a:latin typeface="Consolas" panose="020B0609020204030204" pitchFamily="49" charset="0"/>
-              </a:rPr>
-              <a:t>test.ts</a:t>
-            </a:r>
-            <a:r>
-              <a:rPr lang="en-US" b="0" dirty="0">
-                <a:solidFill>
-                  <a:srgbClr val="800000"/>
-                </a:solidFill>
-                <a:effectLst/>
-                <a:latin typeface="Consolas" panose="020B0609020204030204" pitchFamily="49" charset="0"/>
-              </a:rPr>
-              <a:t>`</a:t>
-            </a:r>
-            <a:r>
-              <a:rPr lang="en-US" b="0" dirty="0">
-                <a:solidFill>
-                  <a:srgbClr val="3B3B3B"/>
-                </a:solidFill>
-                <a:effectLst/>
-                <a:latin typeface="Consolas" panose="020B0609020204030204" pitchFamily="49" charset="0"/>
-              </a:rPr>
-              <a:t> for tests</a:t>
-            </a:r>
-          </a:p>
-          <a:p>
-            <a:pPr>
-              <a:buNone/>
-            </a:pPr>
-            <a:r>
-              <a:rPr lang="en-US" b="0" dirty="0">
-                <a:solidFill>
-                  <a:srgbClr val="3B3B3B"/>
-                </a:solidFill>
-                <a:effectLst/>
-                <a:latin typeface="Consolas" panose="020B0609020204030204" pitchFamily="49" charset="0"/>
-              </a:rPr>
-              <a:t>  </a:t>
-            </a:r>
-            <a:r>
-              <a:rPr lang="en-US" b="0" dirty="0">
-                <a:solidFill>
-                  <a:srgbClr val="0451A5"/>
-                </a:solidFill>
-                <a:effectLst/>
-                <a:latin typeface="Consolas" panose="020B0609020204030204" pitchFamily="49" charset="0"/>
-              </a:rPr>
-              <a:t>-</a:t>
-            </a:r>
-            <a:r>
-              <a:rPr lang="en-US" b="0" dirty="0">
-                <a:solidFill>
-                  <a:srgbClr val="3B3B3B"/>
-                </a:solidFill>
-                <a:effectLst/>
-                <a:latin typeface="Consolas" panose="020B0609020204030204" pitchFamily="49" charset="0"/>
-              </a:rPr>
-              <a:t> </a:t>
-            </a:r>
-            <a:r>
-              <a:rPr lang="en-US" b="0" dirty="0">
-                <a:solidFill>
-                  <a:srgbClr val="800000"/>
-                </a:solidFill>
-                <a:effectLst/>
-                <a:latin typeface="Consolas" panose="020B0609020204030204" pitchFamily="49" charset="0"/>
-              </a:rPr>
-              <a:t>`</a:t>
-            </a:r>
-            <a:r>
-              <a:rPr lang="en-US" b="0" dirty="0" err="1">
-                <a:solidFill>
-                  <a:srgbClr val="800000"/>
-                </a:solidFill>
-                <a:effectLst/>
-                <a:latin typeface="Consolas" panose="020B0609020204030204" pitchFamily="49" charset="0"/>
-              </a:rPr>
-              <a:t>scratchpad.ts</a:t>
-            </a:r>
-            <a:r>
-              <a:rPr lang="en-US" b="0" dirty="0">
-                <a:solidFill>
-                  <a:srgbClr val="800000"/>
-                </a:solidFill>
-                <a:effectLst/>
-                <a:latin typeface="Consolas" panose="020B0609020204030204" pitchFamily="49" charset="0"/>
-              </a:rPr>
-              <a:t>`</a:t>
-            </a:r>
-            <a:r>
-              <a:rPr lang="en-US" b="0" dirty="0">
-                <a:solidFill>
-                  <a:srgbClr val="3B3B3B"/>
-                </a:solidFill>
-                <a:effectLst/>
-                <a:latin typeface="Consolas" panose="020B0609020204030204" pitchFamily="49" charset="0"/>
-              </a:rPr>
-              <a:t> for experimental code</a:t>
-            </a:r>
-          </a:p>
-          <a:p>
-            <a:pPr>
-              <a:buNone/>
-            </a:pPr>
-            <a:r>
-              <a:rPr lang="en-US" b="0" dirty="0">
-                <a:solidFill>
-                  <a:srgbClr val="3B3B3B"/>
-                </a:solidFill>
-                <a:effectLst/>
-                <a:latin typeface="Consolas" panose="020B0609020204030204" pitchFamily="49" charset="0"/>
-              </a:rPr>
-              <a:t>  </a:t>
-            </a:r>
-            <a:r>
-              <a:rPr lang="en-US" b="0" dirty="0">
-                <a:solidFill>
-                  <a:srgbClr val="0451A5"/>
-                </a:solidFill>
-                <a:effectLst/>
-                <a:latin typeface="Consolas" panose="020B0609020204030204" pitchFamily="49" charset="0"/>
-              </a:rPr>
-              <a:t>-</a:t>
-            </a:r>
-            <a:r>
-              <a:rPr lang="en-US" b="0" dirty="0">
-                <a:solidFill>
-                  <a:srgbClr val="3B3B3B"/>
-                </a:solidFill>
-                <a:effectLst/>
-                <a:latin typeface="Consolas" panose="020B0609020204030204" pitchFamily="49" charset="0"/>
-              </a:rPr>
-              <a:t> </a:t>
-            </a:r>
-            <a:r>
-              <a:rPr lang="en-US" b="0" dirty="0">
-                <a:solidFill>
-                  <a:srgbClr val="800000"/>
-                </a:solidFill>
-                <a:effectLst/>
-                <a:latin typeface="Consolas" panose="020B0609020204030204" pitchFamily="49" charset="0"/>
-              </a:rPr>
-              <a:t>`</a:t>
-            </a:r>
-            <a:r>
-              <a:rPr lang="en-US" b="0" dirty="0" err="1">
-                <a:solidFill>
-                  <a:srgbClr val="800000"/>
-                </a:solidFill>
-                <a:effectLst/>
-                <a:latin typeface="Consolas" panose="020B0609020204030204" pitchFamily="49" charset="0"/>
-              </a:rPr>
-              <a:t>express.ts</a:t>
-            </a:r>
-            <a:r>
-              <a:rPr lang="en-US" b="0" dirty="0">
-                <a:solidFill>
-                  <a:srgbClr val="800000"/>
-                </a:solidFill>
-                <a:effectLst/>
-                <a:latin typeface="Consolas" panose="020B0609020204030204" pitchFamily="49" charset="0"/>
-              </a:rPr>
-              <a:t>`</a:t>
-            </a:r>
-            <a:r>
-              <a:rPr lang="en-US" b="0" dirty="0">
-                <a:solidFill>
-                  <a:srgbClr val="3B3B3B"/>
-                </a:solidFill>
-                <a:effectLst/>
-                <a:latin typeface="Consolas" panose="020B0609020204030204" pitchFamily="49" charset="0"/>
-              </a:rPr>
-              <a:t> for express app setup</a:t>
-            </a:r>
-          </a:p>
-          <a:p>
-            <a:pPr>
-              <a:buNone/>
-            </a:pPr>
-            <a:r>
-              <a:rPr lang="en-US" b="0" dirty="0">
-                <a:solidFill>
-                  <a:srgbClr val="3B3B3B"/>
-                </a:solidFill>
-                <a:effectLst/>
-                <a:latin typeface="Consolas" panose="020B0609020204030204" pitchFamily="49" charset="0"/>
-              </a:rPr>
-              <a:t>  </a:t>
-            </a:r>
-            <a:r>
-              <a:rPr lang="en-US" b="0" dirty="0">
-                <a:solidFill>
-                  <a:srgbClr val="0451A5"/>
-                </a:solidFill>
-                <a:effectLst/>
-                <a:latin typeface="Consolas" panose="020B0609020204030204" pitchFamily="49" charset="0"/>
-              </a:rPr>
-              <a:t>-</a:t>
-            </a:r>
-            <a:r>
-              <a:rPr lang="en-US" b="0" dirty="0">
-                <a:solidFill>
-                  <a:srgbClr val="3B3B3B"/>
-                </a:solidFill>
-                <a:effectLst/>
-                <a:latin typeface="Consolas" panose="020B0609020204030204" pitchFamily="49" charset="0"/>
-              </a:rPr>
-              <a:t> </a:t>
-            </a:r>
-            <a:r>
-              <a:rPr lang="en-US" b="0" dirty="0">
-                <a:solidFill>
-                  <a:srgbClr val="0451A5"/>
-                </a:solidFill>
-                <a:effectLst/>
-                <a:latin typeface="Consolas" panose="020B0609020204030204" pitchFamily="49" charset="0"/>
-              </a:rPr>
-              <a:t>-</a:t>
-            </a:r>
-            <a:r>
-              <a:rPr lang="en-US" b="0" dirty="0">
-                <a:solidFill>
-                  <a:srgbClr val="3B3B3B"/>
-                </a:solidFill>
-                <a:effectLst/>
-                <a:latin typeface="Consolas" panose="020B0609020204030204" pitchFamily="49" charset="0"/>
-              </a:rPr>
-              <a:t> </a:t>
-            </a:r>
-            <a:r>
-              <a:rPr lang="en-US" b="0" dirty="0">
-                <a:solidFill>
-                  <a:srgbClr val="800000"/>
-                </a:solidFill>
-                <a:effectLst/>
-                <a:latin typeface="Consolas" panose="020B0609020204030204" pitchFamily="49" charset="0"/>
-              </a:rPr>
-              <a:t>`</a:t>
-            </a:r>
-            <a:r>
-              <a:rPr lang="en-US" b="0" dirty="0" err="1">
-                <a:solidFill>
-                  <a:srgbClr val="800000"/>
-                </a:solidFill>
-                <a:effectLst/>
-                <a:latin typeface="Consolas" panose="020B0609020204030204" pitchFamily="49" charset="0"/>
-              </a:rPr>
-              <a:t>src</a:t>
-            </a:r>
-            <a:r>
-              <a:rPr lang="en-US" b="0" dirty="0">
-                <a:solidFill>
-                  <a:srgbClr val="800000"/>
-                </a:solidFill>
-                <a:effectLst/>
-                <a:latin typeface="Consolas" panose="020B0609020204030204" pitchFamily="49" charset="0"/>
-              </a:rPr>
-              <a:t>/</a:t>
-            </a:r>
-            <a:r>
-              <a:rPr lang="en-US" b="0" dirty="0" err="1">
-                <a:solidFill>
-                  <a:srgbClr val="800000"/>
-                </a:solidFill>
-                <a:effectLst/>
-                <a:latin typeface="Consolas" panose="020B0609020204030204" pitchFamily="49" charset="0"/>
-              </a:rPr>
-              <a:t>server.ts</a:t>
-            </a:r>
-            <a:r>
-              <a:rPr lang="en-US" b="0" dirty="0">
-                <a:solidFill>
-                  <a:srgbClr val="800000"/>
-                </a:solidFill>
-                <a:effectLst/>
-                <a:latin typeface="Consolas" panose="020B0609020204030204" pitchFamily="49" charset="0"/>
-              </a:rPr>
-              <a:t>`</a:t>
-            </a:r>
-            <a:r>
-              <a:rPr lang="en-US" b="0" dirty="0">
-                <a:solidFill>
-                  <a:srgbClr val="3B3B3B"/>
-                </a:solidFill>
-                <a:effectLst/>
-                <a:latin typeface="Consolas" panose="020B0609020204030204" pitchFamily="49" charset="0"/>
-              </a:rPr>
-              <a:t> to start the application</a:t>
-            </a:r>
-          </a:p>
-          <a:p>
-            <a:pPr>
-              <a:buNone/>
-            </a:pPr>
-            <a:r>
-              <a:rPr lang="en-US" b="0" dirty="0">
-                <a:solidFill>
-                  <a:srgbClr val="0451A5"/>
-                </a:solidFill>
-                <a:effectLst/>
-                <a:latin typeface="Consolas" panose="020B0609020204030204" pitchFamily="49" charset="0"/>
-              </a:rPr>
-              <a:t>-</a:t>
-            </a:r>
-            <a:r>
-              <a:rPr lang="en-US" b="0" dirty="0">
-                <a:solidFill>
-                  <a:srgbClr val="3B3B3B"/>
-                </a:solidFill>
-                <a:effectLst/>
-                <a:latin typeface="Consolas" panose="020B0609020204030204" pitchFamily="49" charset="0"/>
-              </a:rPr>
-              <a:t> </a:t>
-            </a:r>
-            <a:r>
-              <a:rPr lang="en-US" b="0" dirty="0">
-                <a:solidFill>
-                  <a:srgbClr val="800000"/>
-                </a:solidFill>
-                <a:effectLst/>
-                <a:latin typeface="Consolas" panose="020B0609020204030204" pitchFamily="49" charset="0"/>
-              </a:rPr>
-              <a:t>`</a:t>
-            </a:r>
-            <a:r>
-              <a:rPr lang="en-US" b="0" dirty="0" err="1">
-                <a:solidFill>
-                  <a:srgbClr val="800000"/>
-                </a:solidFill>
-                <a:effectLst/>
-                <a:latin typeface="Consolas" panose="020B0609020204030204" pitchFamily="49" charset="0"/>
-              </a:rPr>
-              <a:t>package.json</a:t>
-            </a:r>
-            <a:r>
-              <a:rPr lang="en-US" b="0" dirty="0">
-                <a:solidFill>
-                  <a:srgbClr val="800000"/>
-                </a:solidFill>
-                <a:effectLst/>
-                <a:latin typeface="Consolas" panose="020B0609020204030204" pitchFamily="49" charset="0"/>
-              </a:rPr>
-              <a:t>`</a:t>
-            </a:r>
-            <a:r>
-              <a:rPr lang="en-US" b="0" dirty="0">
-                <a:solidFill>
-                  <a:srgbClr val="3B3B3B"/>
-                </a:solidFill>
-                <a:effectLst/>
-                <a:latin typeface="Consolas" panose="020B0609020204030204" pitchFamily="49" charset="0"/>
-              </a:rPr>
-              <a:t> for dependencies and scripts</a:t>
-            </a:r>
           </a:p>
           <a:p>
             <a:pPr>

</xml_diff>